<commit_message>
updated ppt in Documentation folder
</commit_message>
<xml_diff>
--- a/Documentation/Scabiv0.2.pptx
+++ b/Documentation/Scabiv0.2.pptx
@@ -2450,8 +2450,8 @@
         </p:nvSpPr>
         <p:spPr>
           <a:xfrm>
-            <a:off x="5530987" y="6280167"/>
-            <a:ext cx="4224233" cy="369332"/>
+            <a:off x="5183188" y="6280167"/>
+            <a:ext cx="4775731" cy="369332"/>
           </a:xfrm>
           <a:prstGeom prst="rect">
             <a:avLst/>
@@ -2466,7 +2466,11 @@
           <a:p>
             <a:r>
               <a:rPr lang="en-IN" dirty="0" smtClean="0"/>
-              <a:t>https://github.com/dilshadmustafa/scabi</a:t>
+              <a:t>https</a:t>
+            </a:r>
+            <a:r>
+              <a:rPr lang="en-IN" dirty="0" smtClean="0"/>
+              <a:t>://www.github.com/dilshadmustafa/scabi</a:t>
             </a:r>
             <a:endParaRPr lang="en-IN" dirty="0"/>
           </a:p>
@@ -29764,19 +29768,6 @@
               <a:t> Cluster can be scaled out horizontally by adding more compute hardware, starting more compute servers, or running compute servers with more number of threads per </a:t>
             </a:r>
             <a:r>
-              <a:rPr lang="en-US" spc="-1" dirty="0" err="1" smtClean="0">
-                <a:solidFill>
-                  <a:srgbClr val="000000"/>
-                </a:solidFill>
-                <a:uFill>
-                  <a:solidFill>
-                    <a:srgbClr val="FFFFFF"/>
-                  </a:solidFill>
-                </a:uFill>
-              </a:rPr>
-              <a:t>compue</a:t>
-            </a:r>
-            <a:r>
               <a:rPr lang="en-US" spc="-1" dirty="0" smtClean="0">
                 <a:solidFill>
                   <a:srgbClr val="000000"/>
@@ -29787,7 +29778,20 @@
                   </a:solidFill>
                 </a:uFill>
               </a:rPr>
-              <a:t> server or adding more Meta Servers with its own Cluster of Compute Servers.</a:t>
+              <a:t>compute </a:t>
+            </a:r>
+            <a:r>
+              <a:rPr lang="en-US" spc="-1" dirty="0" smtClean="0">
+                <a:solidFill>
+                  <a:srgbClr val="000000"/>
+                </a:solidFill>
+                <a:uFill>
+                  <a:solidFill>
+                    <a:srgbClr val="FFFFFF"/>
+                  </a:solidFill>
+                </a:uFill>
+              </a:rPr>
+              <a:t>server or adding more Meta Servers with its own Cluster of Compute Servers.</a:t>
             </a:r>
           </a:p>
           <a:p>
@@ -30044,7 +30048,7 @@
         <p:spPr>
           <a:xfrm>
             <a:off x="182528" y="1248446"/>
-            <a:ext cx="4532010" cy="2031325"/>
+            <a:ext cx="6417141" cy="2031325"/>
           </a:xfrm>
           <a:prstGeom prst="rect">
             <a:avLst/>
@@ -30140,32 +30144,17 @@
             </a:r>
             <a:r>
               <a:rPr lang="en-US" dirty="0" smtClean="0"/>
-              <a:t> clone &lt;</a:t>
-            </a:r>
-            <a:r>
-              <a:rPr lang="en-US" dirty="0" err="1" smtClean="0"/>
-              <a:t>scabi</a:t>
+              <a:t> clone </a:t>
             </a:r>
             <a:r>
               <a:rPr lang="en-US" dirty="0" smtClean="0"/>
-              <a:t> project </a:t>
-            </a:r>
-            <a:r>
-              <a:rPr lang="en-US" dirty="0" err="1" smtClean="0"/>
-              <a:t>github</a:t>
+              <a:t>https</a:t>
             </a:r>
             <a:r>
               <a:rPr lang="en-US" dirty="0" smtClean="0"/>
-              <a:t> </a:t>
-            </a:r>
-            <a:r>
-              <a:rPr lang="en-US" dirty="0" err="1" smtClean="0"/>
-              <a:t>url</a:t>
-            </a:r>
-            <a:r>
-              <a:rPr lang="en-US" dirty="0" smtClean="0"/>
-              <a:t>&gt;</a:t>
-            </a:r>
+              <a:t>://www.github.com/dilshadmustafa/scabi.git</a:t>
+            </a:r>
+            <a:endParaRPr lang="en-US" dirty="0" smtClean="0"/>
           </a:p>
         </p:txBody>
       </p:sp>
@@ -31591,7 +31580,15 @@
           <a:p>
             <a:r>
               <a:rPr lang="en-US" dirty="0" smtClean="0"/>
-              <a:t>5. The file scabi-compute.jar will be created</a:t>
+              <a:t>5. The file </a:t>
+            </a:r>
+            <a:r>
+              <a:rPr lang="en-US" dirty="0" smtClean="0"/>
+              <a:t>scabi_compute.jar </a:t>
+            </a:r>
+            <a:r>
+              <a:rPr lang="en-US" dirty="0" smtClean="0"/>
+              <a:t>will be created</a:t>
             </a:r>
           </a:p>
           <a:p>
@@ -34671,9 +34668,6 @@
             <a:pPr marL="342900" indent="-342900"/>
             <a:r>
               <a:rPr lang="en-IN" spc="-1" dirty="0" smtClean="0">
-                <a:solidFill>
-                  <a:srgbClr val="0070C0"/>
-                </a:solidFill>
                 <a:uFill>
                   <a:solidFill>
                     <a:srgbClr val="FFFFFF"/>
@@ -34684,9 +34678,6 @@
             </a:r>
             <a:r>
               <a:rPr lang="en-IN" sz="1800" strike="noStrike" spc="-1" dirty="0" smtClean="0">
-                <a:solidFill>
-                  <a:srgbClr val="000000"/>
-                </a:solidFill>
                 <a:uFill>
                   <a:solidFill>
                     <a:srgbClr val="FFFFFF"/>
@@ -34695,7 +34686,22 @@
                 <a:latin typeface="Arial"/>
                 <a:ea typeface="DejaVu Sans"/>
               </a:rPr>
-              <a:t>. </a:t>
+              <a:t>.</a:t>
+            </a:r>
+            <a:r>
+              <a:rPr lang="en-IN" sz="1800" strike="noStrike" spc="-1" dirty="0" smtClean="0">
+                <a:solidFill>
+                  <a:srgbClr val="000000"/>
+                </a:solidFill>
+                <a:uFill>
+                  <a:solidFill>
+                    <a:srgbClr val="FFFFFF"/>
+                  </a:solidFill>
+                </a:uFill>
+                <a:latin typeface="Arial"/>
+                <a:ea typeface="DejaVu Sans"/>
+              </a:rPr>
+              <a:t> </a:t>
             </a:r>
             <a:r>
               <a:rPr lang="en-IN" sz="1800" strike="noStrike" spc="-1" dirty="0">
@@ -35963,17 +35969,21 @@
               <a:rPr lang="en-US" dirty="0" smtClean="0">
                 <a:hlinkClick r:id="rId2"/>
               </a:rPr>
-              <a:t>mdilshad2015@yahoo.com</a:t>
+              <a:t>mdilshad2016@yahoo.com</a:t>
             </a:r>
             <a:r>
               <a:rPr lang="en-US" dirty="0" smtClean="0"/>
-              <a:t> with a copy to </a:t>
+              <a:t> </a:t>
+            </a:r>
+            <a:r>
+              <a:rPr lang="en-US" dirty="0" smtClean="0"/>
+              <a:t>with a copy to </a:t>
             </a:r>
             <a:r>
               <a:rPr lang="en-US" dirty="0" smtClean="0">
                 <a:hlinkClick r:id="rId3"/>
               </a:rPr>
-              <a:t>mdilshad2015@rediffmail.com</a:t>
+              <a:t>mdilshad2016@rediffmail.com</a:t>
             </a:r>
             <a:endParaRPr lang="en-US" dirty="0" smtClean="0"/>
           </a:p>
@@ -36150,11 +36160,7 @@
             </a:r>
             <a:r>
               <a:rPr lang="en-US" dirty="0" smtClean="0"/>
-              <a:t> </a:t>
-            </a:r>
-            <a:r>
-              <a:rPr lang="en-US" dirty="0" smtClean="0"/>
-              <a:t>with a copy to </a:t>
+              <a:t> with a copy to </a:t>
             </a:r>
             <a:r>
               <a:rPr lang="en-US" dirty="0" smtClean="0">

</xml_diff>